<commit_message>
Typo correction slide 12 in Job Scheduling
</commit_message>
<xml_diff>
--- a/Slides-RPR/2019-H1-DAA-L23-Greedy-Algo-JobScheduling.pptx
+++ b/Slides-RPR/2019-H1-DAA-L23-Greedy-Algo-JobScheduling.pptx
@@ -2459,7 +2459,7 @@
       </p:grpSpPr>
       <p:sp>
         <p:nvSpPr>
-          <p:cNvPr id="102" name="Algo High Level"/>
+          <p:cNvPr id="101" name="Algo High Level"/>
           <p:cNvSpPr txBox="1"/>
           <p:nvPr>
             <p:ph type="title"/>
@@ -2483,7 +2483,7 @@
       </p:sp>
       <p:sp>
         <p:nvSpPr>
-          <p:cNvPr id="103" name="Algo GreedyJob(int d[], set J, int n) {…"/>
+          <p:cNvPr id="102" name="Algo GreedyJob(int d[], set J, int n) {…"/>
           <p:cNvSpPr txBox="1"/>
           <p:nvPr>
             <p:ph type="body" idx="1"/>
@@ -2833,7 +2833,7 @@
       </p:sp>
       <p:sp>
         <p:nvSpPr>
-          <p:cNvPr id="104" name="Slide Number"/>
+          <p:cNvPr id="103" name="Slide Number"/>
           <p:cNvSpPr txBox="1"/>
           <p:nvPr>
             <p:ph type="sldNum" sz="quarter" idx="2"/>
@@ -2860,7 +2860,7 @@
       </p:sp>
       <p:sp>
         <p:nvSpPr>
-          <p:cNvPr id="105" name="DAA/Greedy Algorithms"/>
+          <p:cNvPr id="104" name="DAA/Greedy Algorithms"/>
           <p:cNvSpPr txBox="1"/>
           <p:nvPr/>
         </p:nvSpPr>
@@ -2900,7 +2900,7 @@
       </p:sp>
       <p:sp>
         <p:nvSpPr>
-          <p:cNvPr id="106" name="RPR/"/>
+          <p:cNvPr id="105" name="RPR/"/>
           <p:cNvSpPr txBox="1"/>
           <p:nvPr/>
         </p:nvSpPr>
@@ -2977,7 +2977,7 @@
                                       <p:cBhvr>
                                         <p:cTn id="6" fill="hold"/>
                                         <p:tgtEl>
-                                          <p:spTgt spid="103">
+                                          <p:spTgt spid="102">
                                             <p:bg/>
                                           </p:spTgt>
                                         </p:tgtEl>
@@ -3005,7 +3005,7 @@
                                       <p:cBhvr>
                                         <p:cTn id="8" fill="hold"/>
                                         <p:tgtEl>
-                                          <p:spTgt spid="103">
+                                          <p:spTgt spid="102">
                                             <p:txEl>
                                               <p:pRg st="0" end="0"/>
                                             </p:txEl>
@@ -3053,7 +3053,7 @@
                                       <p:cBhvr>
                                         <p:cTn id="12" fill="hold"/>
                                         <p:tgtEl>
-                                          <p:spTgt spid="103">
+                                          <p:spTgt spid="102">
                                             <p:txEl>
                                               <p:pRg st="1" end="1"/>
                                             </p:txEl>
@@ -3101,7 +3101,7 @@
                                       <p:cBhvr>
                                         <p:cTn id="16" fill="hold"/>
                                         <p:tgtEl>
-                                          <p:spTgt spid="103">
+                                          <p:spTgt spid="102">
                                             <p:txEl>
                                               <p:pRg st="2" end="2"/>
                                             </p:txEl>
@@ -3149,7 +3149,7 @@
                                       <p:cBhvr>
                                         <p:cTn id="20" fill="hold"/>
                                         <p:tgtEl>
-                                          <p:spTgt spid="103">
+                                          <p:spTgt spid="102">
                                             <p:txEl>
                                               <p:pRg st="3" end="3"/>
                                             </p:txEl>
@@ -3197,7 +3197,7 @@
                                       <p:cBhvr>
                                         <p:cTn id="24" fill="hold"/>
                                         <p:tgtEl>
-                                          <p:spTgt spid="103">
+                                          <p:spTgt spid="102">
                                             <p:txEl>
                                               <p:pRg st="4" end="4"/>
                                             </p:txEl>
@@ -3245,7 +3245,7 @@
                                       <p:cBhvr>
                                         <p:cTn id="28" fill="hold"/>
                                         <p:tgtEl>
-                                          <p:spTgt spid="103">
+                                          <p:spTgt spid="102">
                                             <p:txEl>
                                               <p:pRg st="5" end="5"/>
                                             </p:txEl>
@@ -3293,7 +3293,7 @@
                                       <p:cBhvr>
                                         <p:cTn id="32" fill="hold"/>
                                         <p:tgtEl>
-                                          <p:spTgt spid="103">
+                                          <p:spTgt spid="102">
                                             <p:txEl>
                                               <p:pRg st="6" end="6"/>
                                             </p:txEl>
@@ -3341,7 +3341,7 @@
                                       <p:cBhvr>
                                         <p:cTn id="36" fill="hold"/>
                                         <p:tgtEl>
-                                          <p:spTgt spid="103">
+                                          <p:spTgt spid="102">
                                             <p:txEl>
                                               <p:pRg st="7" end="7"/>
                                             </p:txEl>
@@ -3389,7 +3389,7 @@
                                       <p:cBhvr>
                                         <p:cTn id="40" fill="hold"/>
                                         <p:tgtEl>
-                                          <p:spTgt spid="103">
+                                          <p:spTgt spid="102">
                                             <p:txEl>
                                               <p:pRg st="8" end="8"/>
                                             </p:txEl>
@@ -3434,7 +3434,7 @@
       </p:par>
     </p:tnLst>
     <p:bldLst>
-      <p:bldP build="p" bldLvl="5" animBg="1" rev="0" advAuto="0" spid="103" grpId="1"/>
+      <p:bldP build="p" bldLvl="5" animBg="1" rev="0" advAuto="0" spid="102" grpId="1"/>
     </p:bldLst>
   </p:timing>
 </p:sld>
@@ -3459,7 +3459,7 @@
       </p:grpSpPr>
       <p:sp>
         <p:nvSpPr>
-          <p:cNvPr id="108" name="Algo-1: Job Scheduling"/>
+          <p:cNvPr id="107" name="Algo-1: Job Scheduling"/>
           <p:cNvSpPr txBox="1"/>
           <p:nvPr>
             <p:ph type="title"/>
@@ -3483,7 +3483,7 @@
       </p:sp>
       <p:sp>
         <p:nvSpPr>
-          <p:cNvPr id="109" name="int JobSchedule2(int d[], int j[], int n) {…"/>
+          <p:cNvPr id="108" name="int JobSchedule2(int d[], int j[], int n) {…"/>
           <p:cNvSpPr txBox="1"/>
           <p:nvPr>
             <p:ph type="body" idx="1"/>
@@ -4010,7 +4010,7 @@
       </p:sp>
       <p:sp>
         <p:nvSpPr>
-          <p:cNvPr id="110" name="Slide Number"/>
+          <p:cNvPr id="109" name="Slide Number"/>
           <p:cNvSpPr txBox="1"/>
           <p:nvPr>
             <p:ph type="sldNum" sz="quarter" idx="2"/>
@@ -4037,7 +4037,7 @@
       </p:sp>
       <p:sp>
         <p:nvSpPr>
-          <p:cNvPr id="111" name="DAA/Greedy Algorithms"/>
+          <p:cNvPr id="110" name="DAA/Greedy Algorithms"/>
           <p:cNvSpPr txBox="1"/>
           <p:nvPr/>
         </p:nvSpPr>
@@ -4077,7 +4077,7 @@
       </p:sp>
       <p:sp>
         <p:nvSpPr>
-          <p:cNvPr id="112" name="RPR/"/>
+          <p:cNvPr id="111" name="RPR/"/>
           <p:cNvSpPr txBox="1"/>
           <p:nvPr/>
         </p:nvSpPr>
@@ -4154,7 +4154,7 @@
                                       <p:cBhvr>
                                         <p:cTn id="6" fill="hold"/>
                                         <p:tgtEl>
-                                          <p:spTgt spid="109">
+                                          <p:spTgt spid="108">
                                             <p:bg/>
                                           </p:spTgt>
                                         </p:tgtEl>
@@ -4182,7 +4182,7 @@
                                       <p:cBhvr>
                                         <p:cTn id="8" fill="hold"/>
                                         <p:tgtEl>
-                                          <p:spTgt spid="109">
+                                          <p:spTgt spid="108">
                                             <p:txEl>
                                               <p:pRg st="0" end="0"/>
                                             </p:txEl>
@@ -4230,7 +4230,7 @@
                                       <p:cBhvr>
                                         <p:cTn id="12" fill="hold"/>
                                         <p:tgtEl>
-                                          <p:spTgt spid="109">
+                                          <p:spTgt spid="108">
                                             <p:txEl>
                                               <p:pRg st="1" end="1"/>
                                             </p:txEl>
@@ -4278,7 +4278,7 @@
                                       <p:cBhvr>
                                         <p:cTn id="16" fill="hold"/>
                                         <p:tgtEl>
-                                          <p:spTgt spid="109">
+                                          <p:spTgt spid="108">
                                             <p:txEl>
                                               <p:pRg st="2" end="2"/>
                                             </p:txEl>
@@ -4326,7 +4326,7 @@
                                       <p:cBhvr>
                                         <p:cTn id="20" fill="hold"/>
                                         <p:tgtEl>
-                                          <p:spTgt spid="109">
+                                          <p:spTgt spid="108">
                                             <p:txEl>
                                               <p:pRg st="3" end="3"/>
                                             </p:txEl>
@@ -4374,7 +4374,7 @@
                                       <p:cBhvr>
                                         <p:cTn id="24" fill="hold"/>
                                         <p:tgtEl>
-                                          <p:spTgt spid="109">
+                                          <p:spTgt spid="108">
                                             <p:txEl>
                                               <p:pRg st="4" end="4"/>
                                             </p:txEl>
@@ -4422,7 +4422,7 @@
                                       <p:cBhvr>
                                         <p:cTn id="28" fill="hold"/>
                                         <p:tgtEl>
-                                          <p:spTgt spid="109">
+                                          <p:spTgt spid="108">
                                             <p:txEl>
                                               <p:pRg st="5" end="5"/>
                                             </p:txEl>
@@ -4470,7 +4470,7 @@
                                       <p:cBhvr>
                                         <p:cTn id="32" fill="hold"/>
                                         <p:tgtEl>
-                                          <p:spTgt spid="109">
+                                          <p:spTgt spid="108">
                                             <p:txEl>
                                               <p:pRg st="6" end="6"/>
                                             </p:txEl>
@@ -4518,7 +4518,7 @@
                                       <p:cBhvr>
                                         <p:cTn id="36" fill="hold"/>
                                         <p:tgtEl>
-                                          <p:spTgt spid="109">
+                                          <p:spTgt spid="108">
                                             <p:txEl>
                                               <p:pRg st="7" end="7"/>
                                             </p:txEl>
@@ -4566,7 +4566,7 @@
                                       <p:cBhvr>
                                         <p:cTn id="40" fill="hold"/>
                                         <p:tgtEl>
-                                          <p:spTgt spid="109">
+                                          <p:spTgt spid="108">
                                             <p:txEl>
                                               <p:pRg st="8" end="8"/>
                                             </p:txEl>
@@ -4614,7 +4614,7 @@
                                       <p:cBhvr>
                                         <p:cTn id="44" fill="hold"/>
                                         <p:tgtEl>
-                                          <p:spTgt spid="109">
+                                          <p:spTgt spid="108">
                                             <p:txEl>
                                               <p:pRg st="9" end="9"/>
                                             </p:txEl>
@@ -4662,7 +4662,7 @@
                                       <p:cBhvr>
                                         <p:cTn id="48" fill="hold"/>
                                         <p:tgtEl>
-                                          <p:spTgt spid="109">
+                                          <p:spTgt spid="108">
                                             <p:txEl>
                                               <p:pRg st="10" end="10"/>
                                             </p:txEl>
@@ -4710,7 +4710,7 @@
                                       <p:cBhvr>
                                         <p:cTn id="52" fill="hold"/>
                                         <p:tgtEl>
-                                          <p:spTgt spid="109">
+                                          <p:spTgt spid="108">
                                             <p:txEl>
                                               <p:pRg st="11" end="11"/>
                                             </p:txEl>
@@ -4755,7 +4755,7 @@
       </p:par>
     </p:tnLst>
     <p:bldLst>
-      <p:bldP build="p" bldLvl="5" animBg="1" rev="0" advAuto="0" spid="109" grpId="1"/>
+      <p:bldP build="p" bldLvl="5" animBg="1" rev="0" advAuto="0" spid="108" grpId="1"/>
     </p:bldLst>
   </p:timing>
 </p:sld>
@@ -4780,7 +4780,7 @@
       </p:grpSpPr>
       <p:sp>
         <p:nvSpPr>
-          <p:cNvPr id="114" name="Algo1: Job Scheduling"/>
+          <p:cNvPr id="113" name="Algo1: Job Scheduling"/>
           <p:cNvSpPr txBox="1"/>
           <p:nvPr>
             <p:ph type="title"/>
@@ -4816,7 +4816,7 @@
       </p:sp>
       <p:sp>
         <p:nvSpPr>
-          <p:cNvPr id="115" name="for(i=2; i≤n; i++) {…"/>
+          <p:cNvPr id="114" name="for(i=2; i≤n; i++) {…"/>
           <p:cNvSpPr txBox="1"/>
           <p:nvPr>
             <p:ph type="body" idx="1"/>
@@ -5093,7 +5093,7 @@
                 <a:cs typeface="Courier New"/>
                 <a:sym typeface="Courier New"/>
               </a:rPr>
-              <a:t>&amp;&amp;(d[J[r]&gt;r)){</a:t>
+              <a:t>&amp;&amp;(d[i]&gt;r)){</a:t>
             </a:r>
             <a:endParaRPr i="0">
               <a:latin typeface="Courier New"/>
@@ -5471,7 +5471,7 @@
       </p:sp>
       <p:sp>
         <p:nvSpPr>
-          <p:cNvPr id="116" name="Slide Number"/>
+          <p:cNvPr id="115" name="Slide Number"/>
           <p:cNvSpPr txBox="1"/>
           <p:nvPr>
             <p:ph type="sldNum" sz="quarter" idx="2"/>
@@ -5498,7 +5498,7 @@
       </p:sp>
       <p:sp>
         <p:nvSpPr>
-          <p:cNvPr id="117" name="DAA/Greedy Algorithms"/>
+          <p:cNvPr id="116" name="DAA/Greedy Algorithms"/>
           <p:cNvSpPr txBox="1"/>
           <p:nvPr/>
         </p:nvSpPr>
@@ -5538,7 +5538,7 @@
       </p:sp>
       <p:sp>
         <p:nvSpPr>
-          <p:cNvPr id="118" name="RPR/"/>
+          <p:cNvPr id="117" name="RPR/"/>
           <p:cNvSpPr txBox="1"/>
           <p:nvPr/>
         </p:nvSpPr>
@@ -5615,7 +5615,7 @@
                                       <p:cBhvr>
                                         <p:cTn id="6" fill="hold"/>
                                         <p:tgtEl>
-                                          <p:spTgt spid="115">
+                                          <p:spTgt spid="114">
                                             <p:bg/>
                                           </p:spTgt>
                                         </p:tgtEl>
@@ -5643,7 +5643,7 @@
                                       <p:cBhvr>
                                         <p:cTn id="8" fill="hold"/>
                                         <p:tgtEl>
-                                          <p:spTgt spid="115">
+                                          <p:spTgt spid="114">
                                             <p:txEl>
                                               <p:pRg st="0" end="0"/>
                                             </p:txEl>
@@ -5691,7 +5691,7 @@
                                       <p:cBhvr>
                                         <p:cTn id="12" fill="hold"/>
                                         <p:tgtEl>
-                                          <p:spTgt spid="115">
+                                          <p:spTgt spid="114">
                                             <p:txEl>
                                               <p:pRg st="1" end="1"/>
                                             </p:txEl>
@@ -5739,7 +5739,7 @@
                                       <p:cBhvr>
                                         <p:cTn id="16" fill="hold"/>
                                         <p:tgtEl>
-                                          <p:spTgt spid="115">
+                                          <p:spTgt spid="114">
                                             <p:txEl>
                                               <p:pRg st="2" end="2"/>
                                             </p:txEl>
@@ -5787,7 +5787,7 @@
                                       <p:cBhvr>
                                         <p:cTn id="20" fill="hold"/>
                                         <p:tgtEl>
-                                          <p:spTgt spid="115">
+                                          <p:spTgt spid="114">
                                             <p:txEl>
                                               <p:pRg st="3" end="3"/>
                                             </p:txEl>
@@ -5835,7 +5835,7 @@
                                       <p:cBhvr>
                                         <p:cTn id="24" fill="hold"/>
                                         <p:tgtEl>
-                                          <p:spTgt spid="115">
+                                          <p:spTgt spid="114">
                                             <p:txEl>
                                               <p:pRg st="4" end="4"/>
                                             </p:txEl>
@@ -5883,7 +5883,7 @@
                                       <p:cBhvr>
                                         <p:cTn id="28" fill="hold"/>
                                         <p:tgtEl>
-                                          <p:spTgt spid="115">
+                                          <p:spTgt spid="114">
                                             <p:txEl>
                                               <p:pRg st="5" end="5"/>
                                             </p:txEl>
@@ -5931,7 +5931,7 @@
                                       <p:cBhvr>
                                         <p:cTn id="32" fill="hold"/>
                                         <p:tgtEl>
-                                          <p:spTgt spid="115">
+                                          <p:spTgt spid="114">
                                             <p:txEl>
                                               <p:pRg st="6" end="6"/>
                                             </p:txEl>
@@ -5979,7 +5979,7 @@
                                       <p:cBhvr>
                                         <p:cTn id="36" fill="hold"/>
                                         <p:tgtEl>
-                                          <p:spTgt spid="115">
+                                          <p:spTgt spid="114">
                                             <p:txEl>
                                               <p:pRg st="7" end="7"/>
                                             </p:txEl>
@@ -6027,7 +6027,7 @@
                                       <p:cBhvr>
                                         <p:cTn id="40" fill="hold"/>
                                         <p:tgtEl>
-                                          <p:spTgt spid="115">
+                                          <p:spTgt spid="114">
                                             <p:txEl>
                                               <p:pRg st="8" end="8"/>
                                             </p:txEl>
@@ -6075,7 +6075,7 @@
                                       <p:cBhvr>
                                         <p:cTn id="44" fill="hold"/>
                                         <p:tgtEl>
-                                          <p:spTgt spid="115">
+                                          <p:spTgt spid="114">
                                             <p:txEl>
                                               <p:pRg st="9" end="9"/>
                                             </p:txEl>
@@ -6123,7 +6123,7 @@
                                       <p:cBhvr>
                                         <p:cTn id="48" fill="hold"/>
                                         <p:tgtEl>
-                                          <p:spTgt spid="115">
+                                          <p:spTgt spid="114">
                                             <p:txEl>
                                               <p:pRg st="10" end="10"/>
                                             </p:txEl>
@@ -6171,7 +6171,7 @@
                                       <p:cBhvr>
                                         <p:cTn id="52" fill="hold"/>
                                         <p:tgtEl>
-                                          <p:spTgt spid="115">
+                                          <p:spTgt spid="114">
                                             <p:txEl>
                                               <p:pRg st="11" end="11"/>
                                             </p:txEl>
@@ -6219,7 +6219,7 @@
                                       <p:cBhvr>
                                         <p:cTn id="56" fill="hold"/>
                                         <p:tgtEl>
-                                          <p:spTgt spid="115">
+                                          <p:spTgt spid="114">
                                             <p:txEl>
                                               <p:pRg st="12" end="12"/>
                                             </p:txEl>
@@ -6267,7 +6267,7 @@
                                       <p:cBhvr>
                                         <p:cTn id="60" fill="hold"/>
                                         <p:tgtEl>
-                                          <p:spTgt spid="115">
+                                          <p:spTgt spid="114">
                                             <p:txEl>
                                               <p:pRg st="13" end="13"/>
                                             </p:txEl>
@@ -6315,7 +6315,7 @@
                                       <p:cBhvr>
                                         <p:cTn id="64" fill="hold"/>
                                         <p:tgtEl>
-                                          <p:spTgt spid="115">
+                                          <p:spTgt spid="114">
                                             <p:txEl>
                                               <p:pRg st="14" end="14"/>
                                             </p:txEl>
@@ -6363,7 +6363,7 @@
                                       <p:cBhvr>
                                         <p:cTn id="68" fill="hold"/>
                                         <p:tgtEl>
-                                          <p:spTgt spid="115">
+                                          <p:spTgt spid="114">
                                             <p:txEl>
                                               <p:pRg st="15" end="15"/>
                                             </p:txEl>
@@ -6408,7 +6408,7 @@
       </p:par>
     </p:tnLst>
     <p:bldLst>
-      <p:bldP build="p" bldLvl="5" animBg="1" rev="0" advAuto="0" spid="115" grpId="1"/>
+      <p:bldP build="p" bldLvl="5" animBg="1" rev="0" advAuto="0" spid="114" grpId="1"/>
     </p:bldLst>
   </p:timing>
 </p:sld>
@@ -6433,7 +6433,7 @@
       </p:grpSpPr>
       <p:sp>
         <p:nvSpPr>
-          <p:cNvPr id="120" name="Algo-1: Time Complexity"/>
+          <p:cNvPr id="119" name="Algo-1: Time Complexity"/>
           <p:cNvSpPr txBox="1"/>
           <p:nvPr>
             <p:ph type="title"/>
@@ -6469,7 +6469,7 @@
       </p:sp>
       <p:sp>
         <p:nvSpPr>
-          <p:cNvPr id="121" name="For loop run n times.…"/>
+          <p:cNvPr id="120" name="For loop run n times.…"/>
           <p:cNvSpPr txBox="1"/>
           <p:nvPr>
             <p:ph type="body" idx="1"/>
@@ -6595,7 +6595,7 @@
       </p:sp>
       <p:sp>
         <p:nvSpPr>
-          <p:cNvPr id="122" name="Slide Number"/>
+          <p:cNvPr id="121" name="Slide Number"/>
           <p:cNvSpPr txBox="1"/>
           <p:nvPr>
             <p:ph type="sldNum" sz="quarter" idx="2"/>
@@ -6622,7 +6622,7 @@
       </p:sp>
       <p:sp>
         <p:nvSpPr>
-          <p:cNvPr id="123" name="DAA/Greedy Algorithms"/>
+          <p:cNvPr id="122" name="DAA/Greedy Algorithms"/>
           <p:cNvSpPr txBox="1"/>
           <p:nvPr/>
         </p:nvSpPr>
@@ -6662,7 +6662,7 @@
       </p:sp>
       <p:sp>
         <p:nvSpPr>
-          <p:cNvPr id="124" name="RPR/"/>
+          <p:cNvPr id="123" name="RPR/"/>
           <p:cNvSpPr txBox="1"/>
           <p:nvPr/>
         </p:nvSpPr>
@@ -6739,7 +6739,7 @@
                                       <p:cBhvr>
                                         <p:cTn id="6" fill="hold"/>
                                         <p:tgtEl>
-                                          <p:spTgt spid="121">
+                                          <p:spTgt spid="120">
                                             <p:bg/>
                                           </p:spTgt>
                                         </p:tgtEl>
@@ -6767,7 +6767,7 @@
                                       <p:cBhvr>
                                         <p:cTn id="8" fill="hold"/>
                                         <p:tgtEl>
-                                          <p:spTgt spid="121">
+                                          <p:spTgt spid="120">
                                             <p:txEl>
                                               <p:pRg st="0" end="0"/>
                                             </p:txEl>
@@ -6815,7 +6815,7 @@
                                       <p:cBhvr>
                                         <p:cTn id="12" fill="hold"/>
                                         <p:tgtEl>
-                                          <p:spTgt spid="121">
+                                          <p:spTgt spid="120">
                                             <p:txEl>
                                               <p:pRg st="1" end="1"/>
                                             </p:txEl>
@@ -6863,7 +6863,7 @@
                                       <p:cBhvr>
                                         <p:cTn id="16" fill="hold"/>
                                         <p:tgtEl>
-                                          <p:spTgt spid="121">
+                                          <p:spTgt spid="120">
                                             <p:txEl>
                                               <p:pRg st="2" end="2"/>
                                             </p:txEl>
@@ -6911,7 +6911,7 @@
                                       <p:cBhvr>
                                         <p:cTn id="20" fill="hold"/>
                                         <p:tgtEl>
-                                          <p:spTgt spid="121">
+                                          <p:spTgt spid="120">
                                             <p:txEl>
                                               <p:pRg st="3" end="3"/>
                                             </p:txEl>
@@ -6959,7 +6959,7 @@
                                       <p:cBhvr>
                                         <p:cTn id="24" fill="hold"/>
                                         <p:tgtEl>
-                                          <p:spTgt spid="121">
+                                          <p:spTgt spid="120">
                                             <p:txEl>
                                               <p:pRg st="4" end="4"/>
                                             </p:txEl>
@@ -7007,7 +7007,7 @@
                                       <p:cBhvr>
                                         <p:cTn id="28" fill="hold"/>
                                         <p:tgtEl>
-                                          <p:spTgt spid="121">
+                                          <p:spTgt spid="120">
                                             <p:txEl>
                                               <p:pRg st="5" end="5"/>
                                             </p:txEl>
@@ -7055,7 +7055,7 @@
                                       <p:cBhvr>
                                         <p:cTn id="32" fill="hold"/>
                                         <p:tgtEl>
-                                          <p:spTgt spid="121">
+                                          <p:spTgt spid="120">
                                             <p:txEl>
                                               <p:pRg st="6" end="6"/>
                                             </p:txEl>
@@ -7100,7 +7100,7 @@
       </p:par>
     </p:tnLst>
     <p:bldLst>
-      <p:bldP build="p" bldLvl="5" animBg="1" rev="0" advAuto="0" spid="121" grpId="1"/>
+      <p:bldP build="p" bldLvl="5" animBg="1" rev="0" advAuto="0" spid="120" grpId="1"/>
     </p:bldLst>
   </p:timing>
 </p:sld>
@@ -7125,7 +7125,7 @@
       </p:grpSpPr>
       <p:sp>
         <p:nvSpPr>
-          <p:cNvPr id="126" name="Algo-2: Job Scheduling"/>
+          <p:cNvPr id="125" name="Algo-2: Job Scheduling"/>
           <p:cNvSpPr txBox="1"/>
           <p:nvPr>
             <p:ph type="title"/>
@@ -7149,7 +7149,7 @@
       </p:sp>
       <p:sp>
         <p:nvSpPr>
-          <p:cNvPr id="127" name="//Approach: schedule a job in the slot where it meets deadline.…"/>
+          <p:cNvPr id="126" name="//Approach: schedule a job in the slot where it meets deadline.…"/>
           <p:cNvSpPr txBox="1"/>
           <p:nvPr>
             <p:ph type="body" idx="1"/>
@@ -7657,7 +7657,7 @@
       </p:sp>
       <p:sp>
         <p:nvSpPr>
-          <p:cNvPr id="128" name="Slide Number"/>
+          <p:cNvPr id="127" name="Slide Number"/>
           <p:cNvSpPr txBox="1"/>
           <p:nvPr>
             <p:ph type="sldNum" sz="quarter" idx="2"/>
@@ -7684,7 +7684,7 @@
       </p:sp>
       <p:sp>
         <p:nvSpPr>
-          <p:cNvPr id="129" name="DAA/Greedy Algorithms"/>
+          <p:cNvPr id="128" name="DAA/Greedy Algorithms"/>
           <p:cNvSpPr txBox="1"/>
           <p:nvPr/>
         </p:nvSpPr>
@@ -7724,7 +7724,7 @@
       </p:sp>
       <p:sp>
         <p:nvSpPr>
-          <p:cNvPr id="130" name="RPR/"/>
+          <p:cNvPr id="129" name="RPR/"/>
           <p:cNvSpPr txBox="1"/>
           <p:nvPr/>
         </p:nvSpPr>
@@ -7801,7 +7801,7 @@
                                       <p:cBhvr>
                                         <p:cTn id="6" fill="hold"/>
                                         <p:tgtEl>
-                                          <p:spTgt spid="127">
+                                          <p:spTgt spid="126">
                                             <p:bg/>
                                           </p:spTgt>
                                         </p:tgtEl>
@@ -7829,7 +7829,7 @@
                                       <p:cBhvr>
                                         <p:cTn id="8" fill="hold"/>
                                         <p:tgtEl>
-                                          <p:spTgt spid="127">
+                                          <p:spTgt spid="126">
                                             <p:txEl>
                                               <p:pRg st="0" end="0"/>
                                             </p:txEl>
@@ -7877,7 +7877,7 @@
                                       <p:cBhvr>
                                         <p:cTn id="12" fill="hold"/>
                                         <p:tgtEl>
-                                          <p:spTgt spid="127">
+                                          <p:spTgt spid="126">
                                             <p:txEl>
                                               <p:pRg st="1" end="1"/>
                                             </p:txEl>
@@ -7925,7 +7925,7 @@
                                       <p:cBhvr>
                                         <p:cTn id="16" fill="hold"/>
                                         <p:tgtEl>
-                                          <p:spTgt spid="127">
+                                          <p:spTgt spid="126">
                                             <p:txEl>
                                               <p:pRg st="2" end="2"/>
                                             </p:txEl>
@@ -7973,7 +7973,7 @@
                                       <p:cBhvr>
                                         <p:cTn id="20" fill="hold"/>
                                         <p:tgtEl>
-                                          <p:spTgt spid="127">
+                                          <p:spTgt spid="126">
                                             <p:txEl>
                                               <p:pRg st="3" end="3"/>
                                             </p:txEl>
@@ -8021,7 +8021,7 @@
                                       <p:cBhvr>
                                         <p:cTn id="24" fill="hold"/>
                                         <p:tgtEl>
-                                          <p:spTgt spid="127">
+                                          <p:spTgt spid="126">
                                             <p:txEl>
                                               <p:pRg st="4" end="4"/>
                                             </p:txEl>
@@ -8069,7 +8069,7 @@
                                       <p:cBhvr>
                                         <p:cTn id="28" fill="hold"/>
                                         <p:tgtEl>
-                                          <p:spTgt spid="127">
+                                          <p:spTgt spid="126">
                                             <p:txEl>
                                               <p:pRg st="5" end="5"/>
                                             </p:txEl>
@@ -8117,7 +8117,7 @@
                                       <p:cBhvr>
                                         <p:cTn id="32" fill="hold"/>
                                         <p:tgtEl>
-                                          <p:spTgt spid="127">
+                                          <p:spTgt spid="126">
                                             <p:txEl>
                                               <p:pRg st="6" end="6"/>
                                             </p:txEl>
@@ -8165,7 +8165,7 @@
                                       <p:cBhvr>
                                         <p:cTn id="36" fill="hold"/>
                                         <p:tgtEl>
-                                          <p:spTgt spid="127">
+                                          <p:spTgt spid="126">
                                             <p:txEl>
                                               <p:pRg st="7" end="7"/>
                                             </p:txEl>
@@ -8213,7 +8213,7 @@
                                       <p:cBhvr>
                                         <p:cTn id="40" fill="hold"/>
                                         <p:tgtEl>
-                                          <p:spTgt spid="127">
+                                          <p:spTgt spid="126">
                                             <p:txEl>
                                               <p:pRg st="8" end="8"/>
                                             </p:txEl>
@@ -8261,7 +8261,7 @@
                                       <p:cBhvr>
                                         <p:cTn id="44" fill="hold"/>
                                         <p:tgtEl>
-                                          <p:spTgt spid="127">
+                                          <p:spTgt spid="126">
                                             <p:txEl>
                                               <p:pRg st="9" end="9"/>
                                             </p:txEl>
@@ -8309,7 +8309,7 @@
                                       <p:cBhvr>
                                         <p:cTn id="48" fill="hold"/>
                                         <p:tgtEl>
-                                          <p:spTgt spid="127">
+                                          <p:spTgt spid="126">
                                             <p:txEl>
                                               <p:pRg st="10" end="10"/>
                                             </p:txEl>
@@ -8357,7 +8357,7 @@
                                       <p:cBhvr>
                                         <p:cTn id="52" fill="hold"/>
                                         <p:tgtEl>
-                                          <p:spTgt spid="127">
+                                          <p:spTgt spid="126">
                                             <p:txEl>
                                               <p:pRg st="11" end="11"/>
                                             </p:txEl>
@@ -8402,7 +8402,7 @@
       </p:par>
     </p:tnLst>
     <p:bldLst>
-      <p:bldP build="p" bldLvl="5" animBg="1" rev="0" advAuto="0" spid="127" grpId="1"/>
+      <p:bldP build="p" bldLvl="5" animBg="1" rev="0" advAuto="0" spid="126" grpId="1"/>
     </p:bldLst>
   </p:timing>
 </p:sld>
@@ -8427,7 +8427,7 @@
       </p:grpSpPr>
       <p:sp>
         <p:nvSpPr>
-          <p:cNvPr id="132" name="Algo-2: Job Scheduling"/>
+          <p:cNvPr id="131" name="Algo-2: Job Scheduling"/>
           <p:cNvSpPr txBox="1"/>
           <p:nvPr>
             <p:ph type="title"/>
@@ -8451,7 +8451,7 @@
       </p:sp>
       <p:sp>
         <p:nvSpPr>
-          <p:cNvPr id="133" name="for(i=1; i≤n; i++) {…"/>
+          <p:cNvPr id="132" name="for(i=1; i≤n; i++) {…"/>
           <p:cNvSpPr txBox="1"/>
           <p:nvPr>
             <p:ph type="body" idx="1"/>
@@ -8811,7 +8811,11 @@
                 <a:cs typeface="Courier New"/>
                 <a:sym typeface="Courier New"/>
               </a:rPr>
-              <a:t>break</a:t>
+              <a:t>break; </a:t>
+            </a:r>
+            <a:r>
+              <a:rPr i="0"/>
+              <a:t>// from while</a:t>
             </a:r>
             <a:endParaRPr i="0">
               <a:latin typeface="Courier New"/>
@@ -8993,7 +8997,7 @@
       </p:sp>
       <p:sp>
         <p:nvSpPr>
-          <p:cNvPr id="134" name="Slide Number"/>
+          <p:cNvPr id="133" name="Slide Number"/>
           <p:cNvSpPr txBox="1"/>
           <p:nvPr>
             <p:ph type="sldNum" sz="quarter" idx="2"/>
@@ -9020,7 +9024,7 @@
       </p:sp>
       <p:sp>
         <p:nvSpPr>
-          <p:cNvPr id="135" name="DAA/Greedy Algorithms"/>
+          <p:cNvPr id="134" name="DAA/Greedy Algorithms"/>
           <p:cNvSpPr txBox="1"/>
           <p:nvPr/>
         </p:nvSpPr>
@@ -9060,7 +9064,7 @@
       </p:sp>
       <p:sp>
         <p:nvSpPr>
-          <p:cNvPr id="136" name="RPR/"/>
+          <p:cNvPr id="135" name="RPR/"/>
           <p:cNvSpPr txBox="1"/>
           <p:nvPr/>
         </p:nvSpPr>
@@ -9137,7 +9141,7 @@
                                       <p:cBhvr>
                                         <p:cTn id="6" fill="hold"/>
                                         <p:tgtEl>
-                                          <p:spTgt spid="133">
+                                          <p:spTgt spid="132">
                                             <p:bg/>
                                           </p:spTgt>
                                         </p:tgtEl>
@@ -9165,7 +9169,7 @@
                                       <p:cBhvr>
                                         <p:cTn id="8" fill="hold"/>
                                         <p:tgtEl>
-                                          <p:spTgt spid="133">
+                                          <p:spTgt spid="132">
                                             <p:txEl>
                                               <p:pRg st="0" end="0"/>
                                             </p:txEl>
@@ -9213,7 +9217,7 @@
                                       <p:cBhvr>
                                         <p:cTn id="12" fill="hold"/>
                                         <p:tgtEl>
-                                          <p:spTgt spid="133">
+                                          <p:spTgt spid="132">
                                             <p:txEl>
                                               <p:pRg st="1" end="1"/>
                                             </p:txEl>
@@ -9261,7 +9265,7 @@
                                       <p:cBhvr>
                                         <p:cTn id="16" fill="hold"/>
                                         <p:tgtEl>
-                                          <p:spTgt spid="133">
+                                          <p:spTgt spid="132">
                                             <p:txEl>
                                               <p:pRg st="2" end="2"/>
                                             </p:txEl>
@@ -9309,7 +9313,7 @@
                                       <p:cBhvr>
                                         <p:cTn id="20" fill="hold"/>
                                         <p:tgtEl>
-                                          <p:spTgt spid="133">
+                                          <p:spTgt spid="132">
                                             <p:txEl>
                                               <p:pRg st="3" end="3"/>
                                             </p:txEl>
@@ -9357,7 +9361,7 @@
                                       <p:cBhvr>
                                         <p:cTn id="24" fill="hold"/>
                                         <p:tgtEl>
-                                          <p:spTgt spid="133">
+                                          <p:spTgt spid="132">
                                             <p:txEl>
                                               <p:pRg st="4" end="4"/>
                                             </p:txEl>
@@ -9405,7 +9409,7 @@
                                       <p:cBhvr>
                                         <p:cTn id="28" fill="hold"/>
                                         <p:tgtEl>
-                                          <p:spTgt spid="133">
+                                          <p:spTgt spid="132">
                                             <p:txEl>
                                               <p:pRg st="5" end="5"/>
                                             </p:txEl>
@@ -9453,7 +9457,7 @@
                                       <p:cBhvr>
                                         <p:cTn id="32" fill="hold"/>
                                         <p:tgtEl>
-                                          <p:spTgt spid="133">
+                                          <p:spTgt spid="132">
                                             <p:txEl>
                                               <p:pRg st="6" end="6"/>
                                             </p:txEl>
@@ -9501,7 +9505,7 @@
                                       <p:cBhvr>
                                         <p:cTn id="36" fill="hold"/>
                                         <p:tgtEl>
-                                          <p:spTgt spid="133">
+                                          <p:spTgt spid="132">
                                             <p:txEl>
                                               <p:pRg st="7" end="7"/>
                                             </p:txEl>
@@ -9549,7 +9553,7 @@
                                       <p:cBhvr>
                                         <p:cTn id="40" fill="hold"/>
                                         <p:tgtEl>
-                                          <p:spTgt spid="133">
+                                          <p:spTgt spid="132">
                                             <p:txEl>
                                               <p:pRg st="8" end="8"/>
                                             </p:txEl>
@@ -9597,7 +9601,7 @@
                                       <p:cBhvr>
                                         <p:cTn id="44" fill="hold"/>
                                         <p:tgtEl>
-                                          <p:spTgt spid="133">
+                                          <p:spTgt spid="132">
                                             <p:txEl>
                                               <p:pRg st="9" end="9"/>
                                             </p:txEl>
@@ -9645,7 +9649,7 @@
                                       <p:cBhvr>
                                         <p:cTn id="48" fill="hold"/>
                                         <p:tgtEl>
-                                          <p:spTgt spid="133">
+                                          <p:spTgt spid="132">
                                             <p:txEl>
                                               <p:pRg st="10" end="10"/>
                                             </p:txEl>
@@ -9693,7 +9697,7 @@
                                       <p:cBhvr>
                                         <p:cTn id="52" fill="hold"/>
                                         <p:tgtEl>
-                                          <p:spTgt spid="133">
+                                          <p:spTgt spid="132">
                                             <p:txEl>
                                               <p:pRg st="11" end="11"/>
                                             </p:txEl>
@@ -9741,7 +9745,7 @@
                                       <p:cBhvr>
                                         <p:cTn id="56" fill="hold"/>
                                         <p:tgtEl>
-                                          <p:spTgt spid="133">
+                                          <p:spTgt spid="132">
                                             <p:txEl>
                                               <p:pRg st="12" end="12"/>
                                             </p:txEl>
@@ -9789,7 +9793,7 @@
                                       <p:cBhvr>
                                         <p:cTn id="60" fill="hold"/>
                                         <p:tgtEl>
-                                          <p:spTgt spid="133">
+                                          <p:spTgt spid="132">
                                             <p:txEl>
                                               <p:pRg st="13" end="13"/>
                                             </p:txEl>
@@ -9837,7 +9841,7 @@
                                       <p:cBhvr>
                                         <p:cTn id="64" fill="hold"/>
                                         <p:tgtEl>
-                                          <p:spTgt spid="133">
+                                          <p:spTgt spid="132">
                                             <p:txEl>
                                               <p:pRg st="14" end="14"/>
                                             </p:txEl>
@@ -9885,7 +9889,7 @@
                                       <p:cBhvr>
                                         <p:cTn id="68" fill="hold"/>
                                         <p:tgtEl>
-                                          <p:spTgt spid="133">
+                                          <p:spTgt spid="132">
                                             <p:txEl>
                                               <p:pRg st="15" end="15"/>
                                             </p:txEl>
@@ -9930,7 +9934,7 @@
       </p:par>
     </p:tnLst>
     <p:bldLst>
-      <p:bldP build="p" bldLvl="5" animBg="1" rev="0" advAuto="0" spid="133" grpId="1"/>
+      <p:bldP build="p" bldLvl="5" animBg="1" rev="0" advAuto="0" spid="132" grpId="1"/>
     </p:bldLst>
   </p:timing>
 </p:sld>
@@ -9955,7 +9959,7 @@
       </p:grpSpPr>
       <p:sp>
         <p:nvSpPr>
-          <p:cNvPr id="138" name="Algo-2: Time Complexity"/>
+          <p:cNvPr id="137" name="Algo-2: Time Complexity"/>
           <p:cNvSpPr txBox="1"/>
           <p:nvPr>
             <p:ph type="title"/>
@@ -9979,7 +9983,7 @@
       </p:sp>
       <p:sp>
         <p:nvSpPr>
-          <p:cNvPr id="139" name="For loop run n times.…"/>
+          <p:cNvPr id="138" name="For loop run n times.…"/>
           <p:cNvSpPr txBox="1"/>
           <p:nvPr>
             <p:ph type="body" idx="1"/>
@@ -10105,7 +10109,7 @@
       </p:sp>
       <p:sp>
         <p:nvSpPr>
-          <p:cNvPr id="140" name="Slide Number"/>
+          <p:cNvPr id="139" name="Slide Number"/>
           <p:cNvSpPr txBox="1"/>
           <p:nvPr>
             <p:ph type="sldNum" sz="quarter" idx="2"/>
@@ -10132,7 +10136,7 @@
       </p:sp>
       <p:sp>
         <p:nvSpPr>
-          <p:cNvPr id="141" name="DAA/Greedy Algorithms"/>
+          <p:cNvPr id="140" name="DAA/Greedy Algorithms"/>
           <p:cNvSpPr txBox="1"/>
           <p:nvPr/>
         </p:nvSpPr>
@@ -10172,7 +10176,7 @@
       </p:sp>
       <p:sp>
         <p:nvSpPr>
-          <p:cNvPr id="142" name="RPR/"/>
+          <p:cNvPr id="141" name="RPR/"/>
           <p:cNvSpPr txBox="1"/>
           <p:nvPr/>
         </p:nvSpPr>
@@ -10249,7 +10253,7 @@
                                       <p:cBhvr>
                                         <p:cTn id="6" fill="hold"/>
                                         <p:tgtEl>
-                                          <p:spTgt spid="139">
+                                          <p:spTgt spid="138">
                                             <p:bg/>
                                           </p:spTgt>
                                         </p:tgtEl>
@@ -10277,7 +10281,7 @@
                                       <p:cBhvr>
                                         <p:cTn id="8" fill="hold"/>
                                         <p:tgtEl>
-                                          <p:spTgt spid="139">
+                                          <p:spTgt spid="138">
                                             <p:txEl>
                                               <p:pRg st="0" end="0"/>
                                             </p:txEl>
@@ -10325,7 +10329,7 @@
                                       <p:cBhvr>
                                         <p:cTn id="12" fill="hold"/>
                                         <p:tgtEl>
-                                          <p:spTgt spid="139">
+                                          <p:spTgt spid="138">
                                             <p:txEl>
                                               <p:pRg st="1" end="1"/>
                                             </p:txEl>
@@ -10373,7 +10377,7 @@
                                       <p:cBhvr>
                                         <p:cTn id="16" fill="hold"/>
                                         <p:tgtEl>
-                                          <p:spTgt spid="139">
+                                          <p:spTgt spid="138">
                                             <p:txEl>
                                               <p:pRg st="2" end="2"/>
                                             </p:txEl>
@@ -10421,7 +10425,7 @@
                                       <p:cBhvr>
                                         <p:cTn id="20" fill="hold"/>
                                         <p:tgtEl>
-                                          <p:spTgt spid="139">
+                                          <p:spTgt spid="138">
                                             <p:txEl>
                                               <p:pRg st="3" end="3"/>
                                             </p:txEl>
@@ -10469,7 +10473,7 @@
                                       <p:cBhvr>
                                         <p:cTn id="24" fill="hold"/>
                                         <p:tgtEl>
-                                          <p:spTgt spid="139">
+                                          <p:spTgt spid="138">
                                             <p:txEl>
                                               <p:pRg st="4" end="4"/>
                                             </p:txEl>
@@ -10517,7 +10521,7 @@
                                       <p:cBhvr>
                                         <p:cTn id="28" fill="hold"/>
                                         <p:tgtEl>
-                                          <p:spTgt spid="139">
+                                          <p:spTgt spid="138">
                                             <p:txEl>
                                               <p:pRg st="5" end="5"/>
                                             </p:txEl>
@@ -10565,7 +10569,7 @@
                                       <p:cBhvr>
                                         <p:cTn id="32" fill="hold"/>
                                         <p:tgtEl>
-                                          <p:spTgt spid="139">
+                                          <p:spTgt spid="138">
                                             <p:txEl>
                                               <p:pRg st="6" end="6"/>
                                             </p:txEl>
@@ -10610,7 +10614,7 @@
       </p:par>
     </p:tnLst>
     <p:bldLst>
-      <p:bldP build="p" bldLvl="5" animBg="1" rev="0" advAuto="0" spid="139" grpId="1"/>
+      <p:bldP build="p" bldLvl="5" animBg="1" rev="0" advAuto="0" spid="138" grpId="1"/>
     </p:bldLst>
   </p:timing>
 </p:sld>
@@ -10635,7 +10639,7 @@
       </p:grpSpPr>
       <p:sp>
         <p:nvSpPr>
-          <p:cNvPr id="144" name="Fast Job Scheduling (Union-Find)"/>
+          <p:cNvPr id="143" name="Fast Job Scheduling (Union-Find)"/>
           <p:cNvSpPr txBox="1"/>
           <p:nvPr>
             <p:ph type="title"/>
@@ -10659,7 +10663,7 @@
       </p:sp>
       <p:sp>
         <p:nvSpPr>
-          <p:cNvPr id="145" name="Let i denote the timeslot i…"/>
+          <p:cNvPr id="144" name="Let i denote the timeslot i…"/>
           <p:cNvSpPr txBox="1"/>
           <p:nvPr>
             <p:ph type="body" idx="1"/>
@@ -10843,7 +10847,7 @@
       </p:sp>
       <p:sp>
         <p:nvSpPr>
-          <p:cNvPr id="146" name="Slide Number"/>
+          <p:cNvPr id="145" name="Slide Number"/>
           <p:cNvSpPr txBox="1"/>
           <p:nvPr>
             <p:ph type="sldNum" sz="quarter" idx="2"/>
@@ -10870,7 +10874,7 @@
       </p:sp>
       <p:sp>
         <p:nvSpPr>
-          <p:cNvPr id="147" name="DAA/Greedy Algorithms"/>
+          <p:cNvPr id="146" name="DAA/Greedy Algorithms"/>
           <p:cNvSpPr txBox="1"/>
           <p:nvPr/>
         </p:nvSpPr>
@@ -10910,7 +10914,7 @@
       </p:sp>
       <p:sp>
         <p:nvSpPr>
-          <p:cNvPr id="148" name="RPR/"/>
+          <p:cNvPr id="147" name="RPR/"/>
           <p:cNvSpPr txBox="1"/>
           <p:nvPr/>
         </p:nvSpPr>
@@ -10976,7 +10980,7 @@
       </p:grpSpPr>
       <p:sp>
         <p:nvSpPr>
-          <p:cNvPr id="150" name="Summary"/>
+          <p:cNvPr id="149" name="Summary"/>
           <p:cNvSpPr txBox="1"/>
           <p:nvPr>
             <p:ph type="title"/>
@@ -11000,7 +11004,7 @@
       </p:sp>
       <p:sp>
         <p:nvSpPr>
-          <p:cNvPr id="151" name="Job Scheduling…"/>
+          <p:cNvPr id="150" name="Job Scheduling…"/>
           <p:cNvSpPr txBox="1"/>
           <p:nvPr>
             <p:ph type="body" idx="1"/>
@@ -11048,7 +11052,7 @@
       </p:sp>
       <p:sp>
         <p:nvSpPr>
-          <p:cNvPr id="152" name="Slide Number"/>
+          <p:cNvPr id="151" name="Slide Number"/>
           <p:cNvSpPr txBox="1"/>
           <p:nvPr>
             <p:ph type="sldNum" sz="quarter" idx="2"/>
@@ -11075,7 +11079,7 @@
       </p:sp>
       <p:sp>
         <p:nvSpPr>
-          <p:cNvPr id="153" name="DAA/Greedy Algorithms"/>
+          <p:cNvPr id="152" name="DAA/Greedy Algorithms"/>
           <p:cNvSpPr txBox="1"/>
           <p:nvPr/>
         </p:nvSpPr>
@@ -11115,7 +11119,7 @@
       </p:sp>
       <p:sp>
         <p:nvSpPr>
-          <p:cNvPr id="154" name="RPR/"/>
+          <p:cNvPr id="153" name="RPR/"/>
           <p:cNvSpPr txBox="1"/>
           <p:nvPr/>
         </p:nvSpPr>
@@ -12604,37 +12608,9 @@
           </a:p>
         </p:txBody>
       </p:sp>
-      <p:sp>
-        <p:nvSpPr>
-          <p:cNvPr id="60" name="Text"/>
-          <p:cNvSpPr txBox="1"/>
-          <p:nvPr/>
-        </p:nvSpPr>
-        <p:spPr>
-          <a:xfrm>
-            <a:off x="4868212" y="3667187"/>
-            <a:ext cx="423576" cy="285626"/>
-          </a:xfrm>
-          <a:prstGeom prst="rect">
-            <a:avLst/>
-          </a:prstGeom>
-          <a:ln w="12700">
-            <a:miter lim="400000"/>
-          </a:ln>
-        </p:spPr>
-        <p:txBody>
-          <a:bodyPr wrap="none" lIns="50800" tIns="50800" rIns="50800" bIns="50800" anchor="ctr">
-            <a:spAutoFit/>
-          </a:bodyPr>
-          <a:lstStyle/>
-          <a:p>
-            <a:pPr/>
-          </a:p>
-        </p:txBody>
-      </p:sp>
       <p:graphicFrame>
         <p:nvGraphicFramePr>
-          <p:cNvPr id="61" name="Table"/>
+          <p:cNvPr id="60" name="Table"/>
           <p:cNvGraphicFramePr/>
           <p:nvPr/>
         </p:nvGraphicFramePr>
@@ -13324,7 +13300,7 @@
                                       <p:cBhvr>
                                         <p:cTn id="28" fill="hold"/>
                                         <p:tgtEl>
-                                          <p:spTgt spid="61"/>
+                                          <p:spTgt spid="60"/>
                                         </p:tgtEl>
                                         <p:attrNameLst>
                                           <p:attrName>style.visibility</p:attrName>
@@ -13365,10 +13341,10 @@
       </p:par>
     </p:tnLst>
     <p:bldLst>
-      <p:bldP build="whole" bldLvl="1" animBg="1" rev="0" advAuto="0" spid="61" grpId="4"/>
       <p:bldP build="p" bldLvl="5" animBg="1" rev="0" advAuto="0" spid="54" grpId="1"/>
+      <p:bldP build="whole" bldLvl="1" animBg="1" rev="0" advAuto="0" spid="59" grpId="3"/>
+      <p:bldP build="whole" bldLvl="1" animBg="1" rev="0" advAuto="0" spid="60" grpId="4"/>
       <p:bldP build="whole" bldLvl="1" animBg="1" rev="0" advAuto="0" spid="58" grpId="2"/>
-      <p:bldP build="whole" bldLvl="1" animBg="1" rev="0" advAuto="0" spid="59" grpId="3"/>
     </p:bldLst>
   </p:timing>
 </p:sld>
@@ -13393,7 +13369,7 @@
       </p:grpSpPr>
       <p:sp>
         <p:nvSpPr>
-          <p:cNvPr id="63" name="Greedy Job Scheduling"/>
+          <p:cNvPr id="62" name="Greedy Job Scheduling"/>
           <p:cNvSpPr txBox="1"/>
           <p:nvPr>
             <p:ph type="title"/>
@@ -13417,7 +13393,7 @@
       </p:sp>
       <p:sp>
         <p:nvSpPr>
-          <p:cNvPr id="64" name="A set of n jobs to run on a computer…"/>
+          <p:cNvPr id="63" name="A set of n jobs to run on a computer…"/>
           <p:cNvSpPr txBox="1"/>
           <p:nvPr>
             <p:ph type="body" idx="1"/>
@@ -13629,7 +13605,7 @@
       </p:sp>
       <p:sp>
         <p:nvSpPr>
-          <p:cNvPr id="65" name="Slide Number"/>
+          <p:cNvPr id="64" name="Slide Number"/>
           <p:cNvSpPr txBox="1"/>
           <p:nvPr>
             <p:ph type="sldNum" sz="quarter" idx="2"/>
@@ -13656,7 +13632,7 @@
       </p:sp>
       <p:sp>
         <p:nvSpPr>
-          <p:cNvPr id="66" name="DAA/Greedy Algorithms"/>
+          <p:cNvPr id="65" name="DAA/Greedy Algorithms"/>
           <p:cNvSpPr txBox="1"/>
           <p:nvPr/>
         </p:nvSpPr>
@@ -13696,7 +13672,7 @@
       </p:sp>
       <p:sp>
         <p:nvSpPr>
-          <p:cNvPr id="67" name="RPR/"/>
+          <p:cNvPr id="66" name="RPR/"/>
           <p:cNvSpPr txBox="1"/>
           <p:nvPr/>
         </p:nvSpPr>
@@ -13773,7 +13749,7 @@
                                       <p:cBhvr>
                                         <p:cTn id="6" fill="hold"/>
                                         <p:tgtEl>
-                                          <p:spTgt spid="64">
+                                          <p:spTgt spid="63">
                                             <p:bg/>
                                           </p:spTgt>
                                         </p:tgtEl>
@@ -13801,7 +13777,7 @@
                                       <p:cBhvr>
                                         <p:cTn id="8" fill="hold"/>
                                         <p:tgtEl>
-                                          <p:spTgt spid="64">
+                                          <p:spTgt spid="63">
                                             <p:txEl>
                                               <p:pRg st="0" end="0"/>
                                             </p:txEl>
@@ -13849,7 +13825,7 @@
                                       <p:cBhvr>
                                         <p:cTn id="12" fill="hold"/>
                                         <p:tgtEl>
-                                          <p:spTgt spid="64">
+                                          <p:spTgt spid="63">
                                             <p:txEl>
                                               <p:pRg st="1" end="1"/>
                                             </p:txEl>
@@ -13897,7 +13873,7 @@
                                       <p:cBhvr>
                                         <p:cTn id="16" fill="hold"/>
                                         <p:tgtEl>
-                                          <p:spTgt spid="64">
+                                          <p:spTgt spid="63">
                                             <p:txEl>
                                               <p:pRg st="2" end="2"/>
                                             </p:txEl>
@@ -13945,7 +13921,7 @@
                                       <p:cBhvr>
                                         <p:cTn id="20" fill="hold"/>
                                         <p:tgtEl>
-                                          <p:spTgt spid="64">
+                                          <p:spTgt spid="63">
                                             <p:txEl>
                                               <p:pRg st="3" end="3"/>
                                             </p:txEl>
@@ -13993,7 +13969,7 @@
                                       <p:cBhvr>
                                         <p:cTn id="24" fill="hold"/>
                                         <p:tgtEl>
-                                          <p:spTgt spid="64">
+                                          <p:spTgt spid="63">
                                             <p:txEl>
                                               <p:pRg st="4" end="4"/>
                                             </p:txEl>
@@ -14041,7 +14017,7 @@
                                       <p:cBhvr>
                                         <p:cTn id="28" fill="hold"/>
                                         <p:tgtEl>
-                                          <p:spTgt spid="64">
+                                          <p:spTgt spid="63">
                                             <p:txEl>
                                               <p:pRg st="5" end="5"/>
                                             </p:txEl>
@@ -14089,7 +14065,7 @@
                                       <p:cBhvr>
                                         <p:cTn id="32" fill="hold"/>
                                         <p:tgtEl>
-                                          <p:spTgt spid="64">
+                                          <p:spTgt spid="63">
                                             <p:txEl>
                                               <p:pRg st="6" end="6"/>
                                             </p:txEl>
@@ -14137,7 +14113,7 @@
                                       <p:cBhvr>
                                         <p:cTn id="36" fill="hold"/>
                                         <p:tgtEl>
-                                          <p:spTgt spid="64">
+                                          <p:spTgt spid="63">
                                             <p:txEl>
                                               <p:pRg st="7" end="7"/>
                                             </p:txEl>
@@ -14182,7 +14158,7 @@
       </p:par>
     </p:tnLst>
     <p:bldLst>
-      <p:bldP build="p" bldLvl="5" animBg="1" rev="0" advAuto="0" spid="64" grpId="1"/>
+      <p:bldP build="p" bldLvl="5" animBg="1" rev="0" advAuto="0" spid="63" grpId="1"/>
     </p:bldLst>
   </p:timing>
 </p:sld>
@@ -14207,7 +14183,7 @@
       </p:grpSpPr>
       <p:sp>
         <p:nvSpPr>
-          <p:cNvPr id="69" name="Example: Job Scheduling"/>
+          <p:cNvPr id="68" name="Example: Job Scheduling"/>
           <p:cNvSpPr txBox="1"/>
           <p:nvPr>
             <p:ph type="title"/>
@@ -14231,7 +14207,7 @@
       </p:sp>
       <p:sp>
         <p:nvSpPr>
-          <p:cNvPr id="70" name="Slide Number"/>
+          <p:cNvPr id="69" name="Slide Number"/>
           <p:cNvSpPr txBox="1"/>
           <p:nvPr>
             <p:ph type="sldNum" sz="quarter" idx="2"/>
@@ -14258,7 +14234,7 @@
       </p:sp>
       <p:sp>
         <p:nvSpPr>
-          <p:cNvPr id="71" name="DAA/Greedy Algorithms"/>
+          <p:cNvPr id="70" name="DAA/Greedy Algorithms"/>
           <p:cNvSpPr txBox="1"/>
           <p:nvPr/>
         </p:nvSpPr>
@@ -14298,7 +14274,7 @@
       </p:sp>
       <p:sp>
         <p:nvSpPr>
-          <p:cNvPr id="72" name="RPR/"/>
+          <p:cNvPr id="71" name="RPR/"/>
           <p:cNvSpPr txBox="1"/>
           <p:nvPr/>
         </p:nvSpPr>
@@ -14338,7 +14314,7 @@
       </p:sp>
       <p:graphicFrame>
         <p:nvGraphicFramePr>
-          <p:cNvPr id="73" name="Table"/>
+          <p:cNvPr id="72" name="Table"/>
           <p:cNvGraphicFramePr/>
           <p:nvPr/>
         </p:nvGraphicFramePr>
@@ -15017,7 +14993,7 @@
       </p:graphicFrame>
       <p:graphicFrame>
         <p:nvGraphicFramePr>
-          <p:cNvPr id="74" name="Table"/>
+          <p:cNvPr id="73" name="Table"/>
           <p:cNvGraphicFramePr/>
           <p:nvPr/>
         </p:nvGraphicFramePr>
@@ -15953,7 +15929,7 @@
       </p:graphicFrame>
       <p:sp>
         <p:nvSpPr>
-          <p:cNvPr id="75" name="Optimal Solution: 1,4"/>
+          <p:cNvPr id="74" name="Optimal Solution: 1,4"/>
           <p:cNvSpPr txBox="1"/>
           <p:nvPr/>
         </p:nvSpPr>
@@ -16042,7 +16018,7 @@
                                       <p:cBhvr>
                                         <p:cTn id="6" fill="hold"/>
                                         <p:tgtEl>
-                                          <p:spTgt spid="73"/>
+                                          <p:spTgt spid="72"/>
                                         </p:tgtEl>
                                         <p:attrNameLst>
                                           <p:attrName>style.visibility</p:attrName>
@@ -16086,7 +16062,7 @@
                                       <p:cBhvr>
                                         <p:cTn id="10" fill="hold"/>
                                         <p:tgtEl>
-                                          <p:spTgt spid="74"/>
+                                          <p:spTgt spid="73"/>
                                         </p:tgtEl>
                                         <p:attrNameLst>
                                           <p:attrName>style.visibility</p:attrName>
@@ -16130,7 +16106,7 @@
                                       <p:cBhvr>
                                         <p:cTn id="14" fill="hold"/>
                                         <p:tgtEl>
-                                          <p:spTgt spid="75"/>
+                                          <p:spTgt spid="74"/>
                                         </p:tgtEl>
                                         <p:attrNameLst>
                                           <p:attrName>style.visibility</p:attrName>
@@ -16171,9 +16147,9 @@
       </p:par>
     </p:tnLst>
     <p:bldLst>
-      <p:bldP build="whole" bldLvl="1" animBg="1" rev="0" advAuto="0" spid="74" grpId="2"/>
-      <p:bldP build="whole" bldLvl="1" animBg="1" rev="0" advAuto="0" spid="73" grpId="1"/>
-      <p:bldP build="whole" bldLvl="1" animBg="1" rev="0" advAuto="0" spid="75" grpId="3"/>
+      <p:bldP build="whole" bldLvl="1" animBg="1" rev="0" advAuto="0" spid="73" grpId="2"/>
+      <p:bldP build="whole" bldLvl="1" animBg="1" rev="0" advAuto="0" spid="72" grpId="1"/>
+      <p:bldP build="whole" bldLvl="1" animBg="1" rev="0" advAuto="0" spid="74" grpId="3"/>
     </p:bldLst>
   </p:timing>
 </p:sld>
@@ -16198,7 +16174,7 @@
       </p:grpSpPr>
       <p:sp>
         <p:nvSpPr>
-          <p:cNvPr id="77" name="Job Scheduling: Greedy Approach"/>
+          <p:cNvPr id="76" name="Job Scheduling: Greedy Approach"/>
           <p:cNvSpPr txBox="1"/>
           <p:nvPr>
             <p:ph type="title"/>
@@ -16222,7 +16198,7 @@
       </p:sp>
       <p:sp>
         <p:nvSpPr>
-          <p:cNvPr id="78" name="What should be the optimization measure to schedule the next job?…"/>
+          <p:cNvPr id="77" name="What should be the optimization measure to schedule the next job?…"/>
           <p:cNvSpPr txBox="1"/>
           <p:nvPr>
             <p:ph type="body" idx="1"/>
@@ -16393,7 +16369,7 @@
       </p:sp>
       <p:sp>
         <p:nvSpPr>
-          <p:cNvPr id="79" name="Slide Number"/>
+          <p:cNvPr id="78" name="Slide Number"/>
           <p:cNvSpPr txBox="1"/>
           <p:nvPr>
             <p:ph type="sldNum" sz="quarter" idx="2"/>
@@ -16420,7 +16396,7 @@
       </p:sp>
       <p:sp>
         <p:nvSpPr>
-          <p:cNvPr id="80" name="DAA/Greedy Algorithms"/>
+          <p:cNvPr id="79" name="DAA/Greedy Algorithms"/>
           <p:cNvSpPr txBox="1"/>
           <p:nvPr/>
         </p:nvSpPr>
@@ -16460,7 +16436,7 @@
       </p:sp>
       <p:sp>
         <p:nvSpPr>
-          <p:cNvPr id="81" name="RPR/"/>
+          <p:cNvPr id="80" name="RPR/"/>
           <p:cNvSpPr txBox="1"/>
           <p:nvPr/>
         </p:nvSpPr>
@@ -16537,7 +16513,7 @@
                                       <p:cBhvr>
                                         <p:cTn id="6" fill="hold"/>
                                         <p:tgtEl>
-                                          <p:spTgt spid="78">
+                                          <p:spTgt spid="77">
                                             <p:bg/>
                                           </p:spTgt>
                                         </p:tgtEl>
@@ -16565,7 +16541,7 @@
                                       <p:cBhvr>
                                         <p:cTn id="8" fill="hold"/>
                                         <p:tgtEl>
-                                          <p:spTgt spid="78">
+                                          <p:spTgt spid="77">
                                             <p:txEl>
                                               <p:pRg st="0" end="0"/>
                                             </p:txEl>
@@ -16613,7 +16589,7 @@
                                       <p:cBhvr>
                                         <p:cTn id="12" fill="hold"/>
                                         <p:tgtEl>
-                                          <p:spTgt spid="78">
+                                          <p:spTgt spid="77">
                                             <p:txEl>
                                               <p:pRg st="1" end="1"/>
                                             </p:txEl>
@@ -16661,7 +16637,7 @@
                                       <p:cBhvr>
                                         <p:cTn id="16" fill="hold"/>
                                         <p:tgtEl>
-                                          <p:spTgt spid="78">
+                                          <p:spTgt spid="77">
                                             <p:txEl>
                                               <p:pRg st="2" end="2"/>
                                             </p:txEl>
@@ -16709,7 +16685,7 @@
                                       <p:cBhvr>
                                         <p:cTn id="20" fill="hold"/>
                                         <p:tgtEl>
-                                          <p:spTgt spid="78">
+                                          <p:spTgt spid="77">
                                             <p:txEl>
                                               <p:pRg st="3" end="3"/>
                                             </p:txEl>
@@ -16757,7 +16733,7 @@
                                       <p:cBhvr>
                                         <p:cTn id="24" fill="hold"/>
                                         <p:tgtEl>
-                                          <p:spTgt spid="78">
+                                          <p:spTgt spid="77">
                                             <p:txEl>
                                               <p:pRg st="4" end="4"/>
                                             </p:txEl>
@@ -16805,7 +16781,7 @@
                                       <p:cBhvr>
                                         <p:cTn id="28" fill="hold"/>
                                         <p:tgtEl>
-                                          <p:spTgt spid="78">
+                                          <p:spTgt spid="77">
                                             <p:txEl>
                                               <p:pRg st="5" end="5"/>
                                             </p:txEl>
@@ -16853,7 +16829,7 @@
                                       <p:cBhvr>
                                         <p:cTn id="32" fill="hold"/>
                                         <p:tgtEl>
-                                          <p:spTgt spid="78">
+                                          <p:spTgt spid="77">
                                             <p:txEl>
                                               <p:pRg st="6" end="6"/>
                                             </p:txEl>
@@ -16901,7 +16877,7 @@
                                       <p:cBhvr>
                                         <p:cTn id="36" fill="hold"/>
                                         <p:tgtEl>
-                                          <p:spTgt spid="78">
+                                          <p:spTgt spid="77">
                                             <p:txEl>
                                               <p:pRg st="7" end="7"/>
                                             </p:txEl>
@@ -16946,7 +16922,7 @@
       </p:par>
     </p:tnLst>
     <p:bldLst>
-      <p:bldP build="p" bldLvl="5" animBg="1" rev="0" advAuto="0" spid="78" grpId="1"/>
+      <p:bldP build="p" bldLvl="5" animBg="1" rev="0" advAuto="0" spid="77" grpId="1"/>
     </p:bldLst>
   </p:timing>
 </p:sld>
@@ -16971,7 +16947,7 @@
       </p:grpSpPr>
       <p:sp>
         <p:nvSpPr>
-          <p:cNvPr id="83" name="Job Scheduling: Greedy Approach"/>
+          <p:cNvPr id="82" name="Job Scheduling: Greedy Approach"/>
           <p:cNvSpPr txBox="1"/>
           <p:nvPr>
             <p:ph type="title"/>
@@ -16995,7 +16971,7 @@
       </p:sp>
       <p:sp>
         <p:nvSpPr>
-          <p:cNvPr id="84" name="Application of First Greedy approach…"/>
+          <p:cNvPr id="83" name="Application of First Greedy approach…"/>
           <p:cNvSpPr txBox="1"/>
           <p:nvPr>
             <p:ph type="body" idx="1"/>
@@ -17105,7 +17081,7 @@
               </a:spcBef>
             </a:pPr>
             <a:r>
-              <a:t>Yes if </a:t>
+              <a:t>Yes if schedule is </a:t>
             </a:r>
             <a:r>
               <a:rPr>
@@ -17182,7 +17158,7 @@
               <a:buNone/>
             </a:pPr>
             <a:r>
-              <a:rPr sz="2400">
+              <a:rPr sz="2200">
                 <a:latin typeface="Courier New"/>
                 <a:ea typeface="Courier New"/>
                 <a:cs typeface="Courier New"/>
@@ -17195,7 +17171,19 @@
               <a:t> </a:t>
             </a:r>
             <a:r>
-              <a:t>is infeasible, thus J remains </a:t>
+              <a:t>is infeasible, thus </a:t>
+            </a:r>
+            <a:r>
+              <a:rPr sz="2600">
+                <a:latin typeface="Courier New"/>
+                <a:ea typeface="Courier New"/>
+                <a:cs typeface="Courier New"/>
+                <a:sym typeface="Courier New"/>
+              </a:rPr>
+              <a:t>J</a:t>
+            </a:r>
+            <a:r>
+              <a:t> remains </a:t>
             </a:r>
             <a:r>
               <a:rPr sz="2400">
@@ -17238,23 +17226,35 @@
               <a:buNone/>
             </a:pPr>
             <a:r>
+              <a:rPr sz="2300">
+                <a:latin typeface="Courier New"/>
+                <a:ea typeface="Courier New"/>
+                <a:cs typeface="Courier New"/>
+                <a:sym typeface="Courier New"/>
+              </a:rPr>
+              <a:t>{1,4,2}</a:t>
+            </a:r>
+            <a:r>
+              <a:rPr sz="2400"/>
+              <a:t> </a:t>
+            </a:r>
+            <a:r>
+              <a:t>is infeasible thus </a:t>
+            </a:r>
+            <a:r>
               <a:rPr sz="2400">
                 <a:latin typeface="Courier New"/>
                 <a:ea typeface="Courier New"/>
                 <a:cs typeface="Courier New"/>
                 <a:sym typeface="Courier New"/>
               </a:rPr>
-              <a:t>{1,4,2}</a:t>
-            </a:r>
-            <a:r>
-              <a:rPr sz="2400"/>
-              <a:t> </a:t>
-            </a:r>
-            <a:r>
-              <a:t>is infeasible thus J remains </a:t>
-            </a:r>
-            <a:r>
-              <a:rPr sz="2400">
+              <a:t>J</a:t>
+            </a:r>
+            <a:r>
+              <a:t> remains </a:t>
+            </a:r>
+            <a:r>
+              <a:rPr sz="2300">
                 <a:latin typeface="Courier New"/>
                 <a:ea typeface="Courier New"/>
                 <a:cs typeface="Courier New"/>
@@ -17346,6 +17346,15 @@
             </a:pPr>
             <a:r>
               <a:rPr>
+                <a:latin typeface="Gill Sans MT"/>
+                <a:ea typeface="Gill Sans MT"/>
+                <a:cs typeface="Gill Sans MT"/>
+                <a:sym typeface="Gill Sans MT"/>
+              </a:rPr>
+              <a:t>Evaluate feasibility for a given set: </a:t>
+            </a:r>
+            <a:r>
+              <a:rPr>
                 <a:latin typeface="Courier New"/>
                 <a:ea typeface="Courier New"/>
                 <a:cs typeface="Courier New"/>
@@ -17360,14 +17369,14 @@
                 <a:cs typeface="Gill Sans MT"/>
                 <a:sym typeface="Gill Sans MT"/>
               </a:rPr>
-              <a:t> to evaluate feasibility for a given set</a:t>
+              <a:t> </a:t>
             </a:r>
           </a:p>
         </p:txBody>
       </p:sp>
       <p:sp>
         <p:nvSpPr>
-          <p:cNvPr id="85" name="Slide Number"/>
+          <p:cNvPr id="84" name="Slide Number"/>
           <p:cNvSpPr txBox="1"/>
           <p:nvPr>
             <p:ph type="sldNum" sz="quarter" idx="2"/>
@@ -17394,7 +17403,7 @@
       </p:sp>
       <p:sp>
         <p:nvSpPr>
-          <p:cNvPr id="86" name="DAA/Greedy Algorithms"/>
+          <p:cNvPr id="85" name="DAA/Greedy Algorithms"/>
           <p:cNvSpPr txBox="1"/>
           <p:nvPr/>
         </p:nvSpPr>
@@ -17434,7 +17443,7 @@
       </p:sp>
       <p:sp>
         <p:nvSpPr>
-          <p:cNvPr id="87" name="RPR/"/>
+          <p:cNvPr id="86" name="RPR/"/>
           <p:cNvSpPr txBox="1"/>
           <p:nvPr/>
         </p:nvSpPr>
@@ -17474,7 +17483,7 @@
       </p:sp>
       <p:graphicFrame>
         <p:nvGraphicFramePr>
-          <p:cNvPr id="88" name="Table"/>
+          <p:cNvPr id="87" name="Table"/>
           <p:cNvGraphicFramePr/>
           <p:nvPr/>
         </p:nvGraphicFramePr>
@@ -17779,7 +17788,7 @@
                           <a:cs typeface="Arial"/>
                           <a:sym typeface="Arial"/>
                         </a:rPr>
-                        <a:t>2</a:t>
+                        <a:t>4</a:t>
                       </a:r>
                     </a:p>
                   </a:txBody>
@@ -17823,7 +17832,7 @@
                           <a:cs typeface="Arial"/>
                           <a:sym typeface="Arial"/>
                         </a:rPr>
-                        <a:t>10</a:t>
+                        <a:t>27</a:t>
                       </a:r>
                     </a:p>
                   </a:txBody>
@@ -18033,7 +18042,7 @@
                           <a:cs typeface="Arial"/>
                           <a:sym typeface="Arial"/>
                         </a:rPr>
-                        <a:t>4</a:t>
+                        <a:t>2</a:t>
                       </a:r>
                     </a:p>
                   </a:txBody>
@@ -18083,7 +18092,7 @@
                           <a:cs typeface="Arial"/>
                           <a:sym typeface="Arial"/>
                         </a:rPr>
-                        <a:t>27</a:t>
+                        <a:t>10</a:t>
                       </a:r>
                     </a:p>
                   </a:txBody>
@@ -18190,7 +18199,7 @@
                                       <p:cBhvr>
                                         <p:cTn id="6" fill="hold"/>
                                         <p:tgtEl>
-                                          <p:spTgt spid="88"/>
+                                          <p:spTgt spid="87"/>
                                         </p:tgtEl>
                                         <p:attrNameLst>
                                           <p:attrName>style.visibility</p:attrName>
@@ -18234,7 +18243,7 @@
                                       <p:cBhvr>
                                         <p:cTn id="10" fill="hold"/>
                                         <p:tgtEl>
-                                          <p:spTgt spid="84">
+                                          <p:spTgt spid="83">
                                             <p:bg/>
                                           </p:spTgt>
                                         </p:tgtEl>
@@ -18262,7 +18271,7 @@
                                       <p:cBhvr>
                                         <p:cTn id="12" fill="hold"/>
                                         <p:tgtEl>
-                                          <p:spTgt spid="84">
+                                          <p:spTgt spid="83">
                                             <p:txEl>
                                               <p:pRg st="0" end="0"/>
                                             </p:txEl>
@@ -18310,7 +18319,7 @@
                                       <p:cBhvr>
                                         <p:cTn id="16" fill="hold"/>
                                         <p:tgtEl>
-                                          <p:spTgt spid="84">
+                                          <p:spTgt spid="83">
                                             <p:txEl>
                                               <p:pRg st="1" end="1"/>
                                             </p:txEl>
@@ -18358,7 +18367,7 @@
                                       <p:cBhvr>
                                         <p:cTn id="20" fill="hold"/>
                                         <p:tgtEl>
-                                          <p:spTgt spid="84">
+                                          <p:spTgt spid="83">
                                             <p:txEl>
                                               <p:pRg st="2" end="2"/>
                                             </p:txEl>
@@ -18406,7 +18415,7 @@
                                       <p:cBhvr>
                                         <p:cTn id="24" fill="hold"/>
                                         <p:tgtEl>
-                                          <p:spTgt spid="84">
+                                          <p:spTgt spid="83">
                                             <p:txEl>
                                               <p:pRg st="3" end="3"/>
                                             </p:txEl>
@@ -18454,7 +18463,7 @@
                                       <p:cBhvr>
                                         <p:cTn id="28" fill="hold"/>
                                         <p:tgtEl>
-                                          <p:spTgt spid="84">
+                                          <p:spTgt spid="83">
                                             <p:txEl>
                                               <p:pRg st="4" end="4"/>
                                             </p:txEl>
@@ -18502,7 +18511,7 @@
                                       <p:cBhvr>
                                         <p:cTn id="32" fill="hold"/>
                                         <p:tgtEl>
-                                          <p:spTgt spid="84">
+                                          <p:spTgt spid="83">
                                             <p:txEl>
                                               <p:pRg st="5" end="5"/>
                                             </p:txEl>
@@ -18550,7 +18559,7 @@
                                       <p:cBhvr>
                                         <p:cTn id="36" fill="hold"/>
                                         <p:tgtEl>
-                                          <p:spTgt spid="84">
+                                          <p:spTgt spid="83">
                                             <p:txEl>
                                               <p:pRg st="6" end="6"/>
                                             </p:txEl>
@@ -18598,7 +18607,7 @@
                                       <p:cBhvr>
                                         <p:cTn id="40" fill="hold"/>
                                         <p:tgtEl>
-                                          <p:spTgt spid="84">
+                                          <p:spTgt spid="83">
                                             <p:txEl>
                                               <p:pRg st="7" end="7"/>
                                             </p:txEl>
@@ -18646,7 +18655,7 @@
                                       <p:cBhvr>
                                         <p:cTn id="44" fill="hold"/>
                                         <p:tgtEl>
-                                          <p:spTgt spid="84">
+                                          <p:spTgt spid="83">
                                             <p:txEl>
                                               <p:pRg st="8" end="8"/>
                                             </p:txEl>
@@ -18694,7 +18703,7 @@
                                       <p:cBhvr>
                                         <p:cTn id="48" fill="hold"/>
                                         <p:tgtEl>
-                                          <p:spTgt spid="84">
+                                          <p:spTgt spid="83">
                                             <p:txEl>
                                               <p:pRg st="9" end="9"/>
                                             </p:txEl>
@@ -18742,7 +18751,7 @@
                                       <p:cBhvr>
                                         <p:cTn id="52" fill="hold"/>
                                         <p:tgtEl>
-                                          <p:spTgt spid="84">
+                                          <p:spTgt spid="83">
                                             <p:txEl>
                                               <p:pRg st="10" end="10"/>
                                             </p:txEl>
@@ -18790,7 +18799,7 @@
                                       <p:cBhvr>
                                         <p:cTn id="56" fill="hold"/>
                                         <p:tgtEl>
-                                          <p:spTgt spid="84">
+                                          <p:spTgt spid="83">
                                             <p:txEl>
                                               <p:pRg st="11" end="11"/>
                                             </p:txEl>
@@ -18838,7 +18847,7 @@
                                       <p:cBhvr>
                                         <p:cTn id="60" fill="hold"/>
                                         <p:tgtEl>
-                                          <p:spTgt spid="84">
+                                          <p:spTgt spid="83">
                                             <p:txEl>
                                               <p:pRg st="12" end="12"/>
                                             </p:txEl>
@@ -18883,8 +18892,8 @@
       </p:par>
     </p:tnLst>
     <p:bldLst>
-      <p:bldP build="whole" bldLvl="1" animBg="1" rev="0" advAuto="0" spid="88" grpId="1"/>
-      <p:bldP build="p" bldLvl="5" animBg="1" rev="0" advAuto="0" spid="84" grpId="2"/>
+      <p:bldP build="whole" bldLvl="1" animBg="1" rev="0" advAuto="0" spid="87" grpId="1"/>
+      <p:bldP build="p" bldLvl="5" animBg="1" rev="0" advAuto="0" spid="83" grpId="2"/>
     </p:bldLst>
   </p:timing>
 </p:sld>
@@ -18909,7 +18918,7 @@
       </p:grpSpPr>
       <p:sp>
         <p:nvSpPr>
-          <p:cNvPr id="90" name="Job Scheduling: Feasible Solution"/>
+          <p:cNvPr id="89" name="Job Scheduling: Feasible Solution"/>
           <p:cNvSpPr txBox="1"/>
           <p:nvPr>
             <p:ph type="title"/>
@@ -18933,7 +18942,7 @@
       </p:sp>
       <p:sp>
         <p:nvSpPr>
-          <p:cNvPr id="91" name="How to determine that a given set of jobs constitute feasible solution.…"/>
+          <p:cNvPr id="90" name="How to determine that a given set of jobs constitute feasible solution.…"/>
           <p:cNvSpPr txBox="1"/>
           <p:nvPr>
             <p:ph type="body" idx="1"/>
@@ -18964,7 +18973,16 @@
               </a:spcBef>
             </a:pPr>
             <a:r>
-              <a:t>Try out all possible permutations in jobs J</a:t>
+              <a:t>Try out all possible permutations in jobs </a:t>
+            </a:r>
+            <a:r>
+              <a:rPr>
+                <a:latin typeface="Courier New"/>
+                <a:ea typeface="Courier New"/>
+                <a:cs typeface="Courier New"/>
+                <a:sym typeface="Courier New"/>
+              </a:rPr>
+              <a:t>J</a:t>
             </a:r>
           </a:p>
           <a:p>
@@ -18985,7 +19003,7 @@
               <a:defRPr sz="3000"/>
             </a:pPr>
             <a:r>
-              <a:t>Easy to check or a given permutation </a:t>
+              <a:t>Easy to check for a given permutation </a:t>
             </a:r>
             <a:r>
               <a:rPr>
@@ -19328,7 +19346,7 @@
       </p:sp>
       <p:sp>
         <p:nvSpPr>
-          <p:cNvPr id="92" name="Slide Number"/>
+          <p:cNvPr id="91" name="Slide Number"/>
           <p:cNvSpPr txBox="1"/>
           <p:nvPr>
             <p:ph type="sldNum" sz="quarter" idx="2"/>
@@ -19355,7 +19373,7 @@
       </p:sp>
       <p:sp>
         <p:nvSpPr>
-          <p:cNvPr id="93" name="DAA/Greedy Algorithms"/>
+          <p:cNvPr id="92" name="DAA/Greedy Algorithms"/>
           <p:cNvSpPr txBox="1"/>
           <p:nvPr/>
         </p:nvSpPr>
@@ -19395,7 +19413,7 @@
       </p:sp>
       <p:sp>
         <p:nvSpPr>
-          <p:cNvPr id="94" name="RPR/"/>
+          <p:cNvPr id="93" name="RPR/"/>
           <p:cNvSpPr txBox="1"/>
           <p:nvPr/>
         </p:nvSpPr>
@@ -19472,7 +19490,7 @@
                                       <p:cBhvr>
                                         <p:cTn id="6" fill="hold"/>
                                         <p:tgtEl>
-                                          <p:spTgt spid="91">
+                                          <p:spTgt spid="90">
                                             <p:bg/>
                                           </p:spTgt>
                                         </p:tgtEl>
@@ -19500,7 +19518,7 @@
                                       <p:cBhvr>
                                         <p:cTn id="8" fill="hold"/>
                                         <p:tgtEl>
-                                          <p:spTgt spid="91">
+                                          <p:spTgt spid="90">
                                             <p:txEl>
                                               <p:pRg st="0" end="0"/>
                                             </p:txEl>
@@ -19548,7 +19566,7 @@
                                       <p:cBhvr>
                                         <p:cTn id="12" fill="hold"/>
                                         <p:tgtEl>
-                                          <p:spTgt spid="91">
+                                          <p:spTgt spid="90">
                                             <p:txEl>
                                               <p:pRg st="1" end="1"/>
                                             </p:txEl>
@@ -19596,7 +19614,7 @@
                                       <p:cBhvr>
                                         <p:cTn id="16" fill="hold"/>
                                         <p:tgtEl>
-                                          <p:spTgt spid="91">
+                                          <p:spTgt spid="90">
                                             <p:txEl>
                                               <p:pRg st="2" end="2"/>
                                             </p:txEl>
@@ -19644,7 +19662,7 @@
                                       <p:cBhvr>
                                         <p:cTn id="20" fill="hold"/>
                                         <p:tgtEl>
-                                          <p:spTgt spid="91">
+                                          <p:spTgt spid="90">
                                             <p:txEl>
                                               <p:pRg st="3" end="3"/>
                                             </p:txEl>
@@ -19692,7 +19710,7 @@
                                       <p:cBhvr>
                                         <p:cTn id="24" fill="hold"/>
                                         <p:tgtEl>
-                                          <p:spTgt spid="91">
+                                          <p:spTgt spid="90">
                                             <p:txEl>
                                               <p:pRg st="4" end="4"/>
                                             </p:txEl>
@@ -19740,7 +19758,7 @@
                                       <p:cBhvr>
                                         <p:cTn id="28" fill="hold"/>
                                         <p:tgtEl>
-                                          <p:spTgt spid="91">
+                                          <p:spTgt spid="90">
                                             <p:txEl>
                                               <p:pRg st="5" end="5"/>
                                             </p:txEl>
@@ -19788,7 +19806,7 @@
                                       <p:cBhvr>
                                         <p:cTn id="32" fill="hold"/>
                                         <p:tgtEl>
-                                          <p:spTgt spid="91">
+                                          <p:spTgt spid="90">
                                             <p:txEl>
                                               <p:pRg st="6" end="6"/>
                                             </p:txEl>
@@ -19836,7 +19854,7 @@
                                       <p:cBhvr>
                                         <p:cTn id="36" fill="hold"/>
                                         <p:tgtEl>
-                                          <p:spTgt spid="91">
+                                          <p:spTgt spid="90">
                                             <p:txEl>
                                               <p:pRg st="7" end="7"/>
                                             </p:txEl>
@@ -19884,7 +19902,7 @@
                                       <p:cBhvr>
                                         <p:cTn id="40" fill="hold"/>
                                         <p:tgtEl>
-                                          <p:spTgt spid="91">
+                                          <p:spTgt spid="90">
                                             <p:txEl>
                                               <p:pRg st="8" end="8"/>
                                             </p:txEl>
@@ -19929,7 +19947,7 @@
       </p:par>
     </p:tnLst>
     <p:bldLst>
-      <p:bldP build="p" bldLvl="5" animBg="1" rev="0" advAuto="0" spid="91" grpId="1"/>
+      <p:bldP build="p" bldLvl="5" animBg="1" rev="0" advAuto="0" spid="90" grpId="1"/>
     </p:bldLst>
   </p:timing>
 </p:sld>
@@ -19954,7 +19972,7 @@
       </p:grpSpPr>
       <p:sp>
         <p:nvSpPr>
-          <p:cNvPr id="96" name="Proof for Feasible Solution"/>
+          <p:cNvPr id="95" name="Proof for Feasible Solution"/>
           <p:cNvSpPr txBox="1"/>
           <p:nvPr>
             <p:ph type="title"/>
@@ -19978,7 +19996,7 @@
       </p:sp>
       <p:sp>
         <p:nvSpPr>
-          <p:cNvPr id="97" name="Theorem 1:…"/>
+          <p:cNvPr id="96" name="Theorem 1:…"/>
           <p:cNvSpPr txBox="1"/>
           <p:nvPr>
             <p:ph type="body" idx="1"/>
@@ -20025,7 +20043,19 @@
               <a:t>J</a:t>
             </a:r>
             <a:r>
-              <a:t> be the set of k jobs and </a:t>
+              <a:t> be the set of </a:t>
+            </a:r>
+            <a:r>
+              <a:rPr>
+                <a:latin typeface="Courier New"/>
+                <a:ea typeface="Courier New"/>
+                <a:cs typeface="Courier New"/>
+                <a:sym typeface="Courier New"/>
+              </a:rPr>
+              <a:t>k</a:t>
+            </a:r>
+            <a:r>
+              <a:t> jobs and </a:t>
             </a:r>
             <a:r>
               <a:rPr>
@@ -20307,14 +20337,14 @@
           <a:p>
             <a:pPr lvl="1"/>
             <a:r>
-              <a:t>The greedy method describes above always obtains an optimal solution to the job scheduling problem.</a:t>
+              <a:t>The greedy method (order jobs in non-increasing order of profit) always obtains an optimal solution to the job scheduling problem.</a:t>
             </a:r>
           </a:p>
         </p:txBody>
       </p:sp>
       <p:sp>
         <p:nvSpPr>
-          <p:cNvPr id="98" name="Slide Number"/>
+          <p:cNvPr id="97" name="Slide Number"/>
           <p:cNvSpPr txBox="1"/>
           <p:nvPr>
             <p:ph type="sldNum" sz="quarter" idx="2"/>
@@ -20341,7 +20371,7 @@
       </p:sp>
       <p:sp>
         <p:nvSpPr>
-          <p:cNvPr id="99" name="DAA/Greedy Algorithms"/>
+          <p:cNvPr id="98" name="DAA/Greedy Algorithms"/>
           <p:cNvSpPr txBox="1"/>
           <p:nvPr/>
         </p:nvSpPr>
@@ -20381,7 +20411,7 @@
       </p:sp>
       <p:sp>
         <p:nvSpPr>
-          <p:cNvPr id="100" name="RPR/"/>
+          <p:cNvPr id="99" name="RPR/"/>
           <p:cNvSpPr txBox="1"/>
           <p:nvPr/>
         </p:nvSpPr>
@@ -20458,7 +20488,7 @@
                                       <p:cBhvr>
                                         <p:cTn id="6" fill="hold"/>
                                         <p:tgtEl>
-                                          <p:spTgt spid="97">
+                                          <p:spTgt spid="96">
                                             <p:bg/>
                                           </p:spTgt>
                                         </p:tgtEl>
@@ -20486,7 +20516,7 @@
                                       <p:cBhvr>
                                         <p:cTn id="8" fill="hold"/>
                                         <p:tgtEl>
-                                          <p:spTgt spid="97">
+                                          <p:spTgt spid="96">
                                             <p:txEl>
                                               <p:pRg st="0" end="0"/>
                                             </p:txEl>
@@ -20534,7 +20564,7 @@
                                       <p:cBhvr>
                                         <p:cTn id="12" fill="hold"/>
                                         <p:tgtEl>
-                                          <p:spTgt spid="97">
+                                          <p:spTgt spid="96">
                                             <p:txEl>
                                               <p:pRg st="1" end="1"/>
                                             </p:txEl>
@@ -20582,7 +20612,7 @@
                                       <p:cBhvr>
                                         <p:cTn id="16" fill="hold"/>
                                         <p:tgtEl>
-                                          <p:spTgt spid="97">
+                                          <p:spTgt spid="96">
                                             <p:txEl>
                                               <p:pRg st="2" end="2"/>
                                             </p:txEl>
@@ -20630,7 +20660,7 @@
                                       <p:cBhvr>
                                         <p:cTn id="20" fill="hold"/>
                                         <p:tgtEl>
-                                          <p:spTgt spid="97">
+                                          <p:spTgt spid="96">
                                             <p:txEl>
                                               <p:pRg st="3" end="3"/>
                                             </p:txEl>
@@ -20675,7 +20705,7 @@
       </p:par>
     </p:tnLst>
     <p:bldLst>
-      <p:bldP build="p" bldLvl="5" animBg="1" rev="0" advAuto="0" spid="97" grpId="1"/>
+      <p:bldP build="p" bldLvl="5" animBg="1" rev="0" advAuto="0" spid="96" grpId="1"/>
     </p:bldLst>
   </p:timing>
 </p:sld>

</xml_diff>